<commit_message>
update developer guide with new images and diagrams
</commit_message>
<xml_diff>
--- a/docs/diagrams/UiComponentClassDiagram.pptx
+++ b/docs/diagrams/UiComponentClassDiagram.pptx
@@ -208,7 +208,7 @@
           <a:p>
             <a:fld id="{F5CC4B3F-88C1-4FFA-B1B6-F41C21DC6924}" type="datetimeFigureOut">
               <a:rPr lang="en-US" smtClean="0"/>
-              <a:t>3/20/18</a:t>
+              <a:t>3/22/18</a:t>
             </a:fld>
             <a:endParaRPr lang="en-US"/>
           </a:p>
@@ -654,7 +654,7 @@
           <a:p>
             <a:fld id="{78C97017-6FC3-485B-9764-EAC9E56C1D49}" type="datetimeFigureOut">
               <a:rPr lang="en-US" smtClean="0"/>
-              <a:t>3/20/18</a:t>
+              <a:t>3/22/18</a:t>
             </a:fld>
             <a:endParaRPr lang="en-US"/>
           </a:p>
@@ -822,7 +822,7 @@
           <a:p>
             <a:fld id="{78C97017-6FC3-485B-9764-EAC9E56C1D49}" type="datetimeFigureOut">
               <a:rPr lang="en-US" smtClean="0"/>
-              <a:t>3/20/18</a:t>
+              <a:t>3/22/18</a:t>
             </a:fld>
             <a:endParaRPr lang="en-US"/>
           </a:p>
@@ -1000,7 +1000,7 @@
           <a:p>
             <a:fld id="{78C97017-6FC3-485B-9764-EAC9E56C1D49}" type="datetimeFigureOut">
               <a:rPr lang="en-US" smtClean="0"/>
-              <a:t>3/20/18</a:t>
+              <a:t>3/22/18</a:t>
             </a:fld>
             <a:endParaRPr lang="en-US"/>
           </a:p>
@@ -1168,7 +1168,7 @@
           <a:p>
             <a:fld id="{78C97017-6FC3-485B-9764-EAC9E56C1D49}" type="datetimeFigureOut">
               <a:rPr lang="en-US" smtClean="0"/>
-              <a:t>3/20/18</a:t>
+              <a:t>3/22/18</a:t>
             </a:fld>
             <a:endParaRPr lang="en-US"/>
           </a:p>
@@ -1413,7 +1413,7 @@
           <a:p>
             <a:fld id="{78C97017-6FC3-485B-9764-EAC9E56C1D49}" type="datetimeFigureOut">
               <a:rPr lang="en-US" smtClean="0"/>
-              <a:t>3/20/18</a:t>
+              <a:t>3/22/18</a:t>
             </a:fld>
             <a:endParaRPr lang="en-US"/>
           </a:p>
@@ -1698,7 +1698,7 @@
           <a:p>
             <a:fld id="{78C97017-6FC3-485B-9764-EAC9E56C1D49}" type="datetimeFigureOut">
               <a:rPr lang="en-US" smtClean="0"/>
-              <a:t>3/20/18</a:t>
+              <a:t>3/22/18</a:t>
             </a:fld>
             <a:endParaRPr lang="en-US"/>
           </a:p>
@@ -2117,7 +2117,7 @@
           <a:p>
             <a:fld id="{78C97017-6FC3-485B-9764-EAC9E56C1D49}" type="datetimeFigureOut">
               <a:rPr lang="en-US" smtClean="0"/>
-              <a:t>3/20/18</a:t>
+              <a:t>3/22/18</a:t>
             </a:fld>
             <a:endParaRPr lang="en-US"/>
           </a:p>
@@ -2234,7 +2234,7 @@
           <a:p>
             <a:fld id="{78C97017-6FC3-485B-9764-EAC9E56C1D49}" type="datetimeFigureOut">
               <a:rPr lang="en-US" smtClean="0"/>
-              <a:t>3/20/18</a:t>
+              <a:t>3/22/18</a:t>
             </a:fld>
             <a:endParaRPr lang="en-US"/>
           </a:p>
@@ -2329,7 +2329,7 @@
           <a:p>
             <a:fld id="{78C97017-6FC3-485B-9764-EAC9E56C1D49}" type="datetimeFigureOut">
               <a:rPr lang="en-US" smtClean="0"/>
-              <a:t>3/20/18</a:t>
+              <a:t>3/22/18</a:t>
             </a:fld>
             <a:endParaRPr lang="en-US"/>
           </a:p>
@@ -2604,7 +2604,7 @@
           <a:p>
             <a:fld id="{78C97017-6FC3-485B-9764-EAC9E56C1D49}" type="datetimeFigureOut">
               <a:rPr lang="en-US" smtClean="0"/>
-              <a:t>3/20/18</a:t>
+              <a:t>3/22/18</a:t>
             </a:fld>
             <a:endParaRPr lang="en-US"/>
           </a:p>
@@ -2856,7 +2856,7 @@
           <a:p>
             <a:fld id="{78C97017-6FC3-485B-9764-EAC9E56C1D49}" type="datetimeFigureOut">
               <a:rPr lang="en-US" smtClean="0"/>
-              <a:t>3/20/18</a:t>
+              <a:t>3/22/18</a:t>
             </a:fld>
             <a:endParaRPr lang="en-US"/>
           </a:p>
@@ -3067,7 +3067,7 @@
           <a:p>
             <a:fld id="{78C97017-6FC3-485B-9764-EAC9E56C1D49}" type="datetimeFigureOut">
               <a:rPr lang="en-US" smtClean="0"/>
-              <a:t>3/20/18</a:t>
+              <a:t>3/22/18</a:t>
             </a:fld>
             <a:endParaRPr lang="en-US"/>
           </a:p>
@@ -3451,7 +3451,7 @@
         <p:spPr>
           <a:xfrm>
             <a:off x="1217465" y="1447800"/>
-            <a:ext cx="4917083" cy="3962400"/>
+            <a:ext cx="4917083" cy="4114800"/>
           </a:xfrm>
           <a:prstGeom prst="roundRect">
             <a:avLst>
@@ -4045,17 +4045,7 @@
                   </a:schemeClr>
                 </a:solidFill>
               </a:rPr>
-              <a:t>Internship</a:t>
-            </a:r>
-            <a:r>
-              <a:rPr lang="en-US" sz="1050" b="1" smtClean="0">
-                <a:solidFill>
-                  <a:schemeClr val="accent3">
-                    <a:lumMod val="75000"/>
-                  </a:schemeClr>
-                </a:solidFill>
-              </a:rPr>
-              <a:t>ListPanel</a:t>
+              <a:t>InternshipListPanel</a:t>
             </a:r>
             <a:endParaRPr lang="en-SG" sz="1050" b="1" dirty="0">
               <a:solidFill>
@@ -4115,17 +4105,7 @@
                   </a:schemeClr>
                 </a:solidFill>
               </a:rPr>
-              <a:t>Internship</a:t>
-            </a:r>
-            <a:r>
-              <a:rPr lang="en-US" sz="1050" b="1" dirty="0" err="1" smtClean="0">
-                <a:solidFill>
-                  <a:schemeClr val="accent3">
-                    <a:lumMod val="75000"/>
-                  </a:schemeClr>
-                </a:solidFill>
-              </a:rPr>
-              <a:t>Card</a:t>
+              <a:t>InternshipCard</a:t>
             </a:r>
             <a:endParaRPr lang="en-SG" sz="1050" b="1" dirty="0">
               <a:solidFill>
@@ -4145,7 +4125,7 @@
         </p:nvSpPr>
         <p:spPr>
           <a:xfrm>
-            <a:off x="2592528" y="4966000"/>
+            <a:off x="2592525" y="4855785"/>
             <a:ext cx="1093635" cy="236841"/>
           </a:xfrm>
           <a:prstGeom prst="rect">
@@ -4479,7 +4459,7 @@
         </p:nvCxnSpPr>
         <p:spPr>
           <a:xfrm rot="16200000" flipH="1">
-            <a:off x="1184119" y="3676012"/>
+            <a:off x="1184116" y="3565797"/>
             <a:ext cx="2396440" cy="420377"/>
           </a:xfrm>
           <a:prstGeom prst="bentConnector2">
@@ -4804,8 +4784,8 @@
         </p:nvCxnSpPr>
         <p:spPr>
           <a:xfrm rot="5400000">
-            <a:off x="3208856" y="2763307"/>
-            <a:ext cx="2798421" cy="1843806"/>
+            <a:off x="3263962" y="2708199"/>
+            <a:ext cx="2688206" cy="1843809"/>
           </a:xfrm>
           <a:prstGeom prst="bentConnector2">
             <a:avLst/>
@@ -5529,6 +5509,156 @@
           </a:p>
         </p:txBody>
       </p:sp>
+      <p:cxnSp>
+        <p:nvCxnSpPr>
+          <p:cNvPr id="45" name="Elbow Connector 63"/>
+          <p:cNvCxnSpPr>
+            <a:endCxn id="48" idx="1"/>
+          </p:cNvCxnSpPr>
+          <p:nvPr/>
+        </p:nvCxnSpPr>
+        <p:spPr>
+          <a:xfrm rot="16200000" flipH="1">
+            <a:off x="1053953" y="3768142"/>
+            <a:ext cx="2713846" cy="363297"/>
+          </a:xfrm>
+          <a:prstGeom prst="bentConnector2">
+            <a:avLst/>
+          </a:prstGeom>
+          <a:ln w="19050">
+            <a:solidFill>
+              <a:schemeClr val="accent3"/>
+            </a:solidFill>
+            <a:headEnd type="none" w="med" len="med"/>
+            <a:tailEnd type="arrow" w="med" len="med"/>
+          </a:ln>
+          <a:effectLst/>
+        </p:spPr>
+        <p:style>
+          <a:lnRef idx="1">
+            <a:schemeClr val="accent2"/>
+          </a:lnRef>
+          <a:fillRef idx="2">
+            <a:schemeClr val="accent2"/>
+          </a:fillRef>
+          <a:effectRef idx="1">
+            <a:schemeClr val="accent2"/>
+          </a:effectRef>
+          <a:fontRef idx="minor">
+            <a:schemeClr val="dk1"/>
+          </a:fontRef>
+        </p:style>
+      </p:cxnSp>
+      <p:sp>
+        <p:nvSpPr>
+          <p:cNvPr id="48" name="Rectangle 11"/>
+          <p:cNvSpPr/>
+          <p:nvPr/>
+        </p:nvSpPr>
+        <p:spPr>
+          <a:xfrm>
+            <a:off x="2592525" y="5188293"/>
+            <a:ext cx="1246798" cy="236841"/>
+          </a:xfrm>
+          <a:prstGeom prst="rect">
+            <a:avLst/>
+          </a:prstGeom>
+          <a:ln w="19050">
+            <a:solidFill>
+              <a:schemeClr val="accent3"/>
+            </a:solidFill>
+          </a:ln>
+          <a:effectLst/>
+        </p:spPr>
+        <p:style>
+          <a:lnRef idx="1">
+            <a:schemeClr val="accent3"/>
+          </a:lnRef>
+          <a:fillRef idx="2">
+            <a:schemeClr val="accent3"/>
+          </a:fillRef>
+          <a:effectRef idx="1">
+            <a:schemeClr val="accent3"/>
+          </a:effectRef>
+          <a:fontRef idx="minor">
+            <a:schemeClr val="dk1"/>
+          </a:fontRef>
+        </p:style>
+        <p:txBody>
+          <a:bodyPr rtlCol="0" anchor="ctr"/>
+          <a:lstStyle/>
+          <a:p>
+            <a:pPr algn="ctr"/>
+            <a:r>
+              <a:rPr lang="en-US" sz="1050" b="1" smtClean="0">
+                <a:solidFill>
+                  <a:schemeClr val="accent3">
+                    <a:lumMod val="75000"/>
+                  </a:schemeClr>
+                </a:solidFill>
+              </a:rPr>
+              <a:t>Glossary</a:t>
+            </a:r>
+            <a:r>
+              <a:rPr lang="en-US" sz="1050" b="1" smtClean="0">
+                <a:solidFill>
+                  <a:schemeClr val="accent3">
+                    <a:lumMod val="75000"/>
+                  </a:schemeClr>
+                </a:solidFill>
+              </a:rPr>
+              <a:t>Window</a:t>
+            </a:r>
+            <a:endParaRPr lang="en-SG" sz="1050" b="1" dirty="0">
+              <a:solidFill>
+                <a:schemeClr val="accent3">
+                  <a:lumMod val="75000"/>
+                </a:schemeClr>
+              </a:solidFill>
+            </a:endParaRPr>
+          </a:p>
+        </p:txBody>
+      </p:sp>
+      <p:cxnSp>
+        <p:nvCxnSpPr>
+          <p:cNvPr id="51" name="Elbow Connector 63"/>
+          <p:cNvCxnSpPr>
+            <a:endCxn id="48" idx="3"/>
+          </p:cNvCxnSpPr>
+          <p:nvPr/>
+        </p:nvCxnSpPr>
+        <p:spPr>
+          <a:xfrm rot="5400000">
+            <a:off x="3376521" y="3145720"/>
+            <a:ext cx="2623797" cy="1698191"/>
+          </a:xfrm>
+          <a:prstGeom prst="bentConnector2">
+            <a:avLst/>
+          </a:prstGeom>
+          <a:ln w="6350">
+            <a:solidFill>
+              <a:schemeClr val="accent3"/>
+            </a:solidFill>
+            <a:headEnd type="none" w="med" len="med"/>
+            <a:tailEnd type="none" w="med" len="med"/>
+          </a:ln>
+          <a:effectLst/>
+        </p:spPr>
+        <p:style>
+          <a:lnRef idx="1">
+            <a:schemeClr val="accent2"/>
+          </a:lnRef>
+          <a:fillRef idx="2">
+            <a:schemeClr val="accent2"/>
+          </a:fillRef>
+          <a:effectRef idx="1">
+            <a:schemeClr val="accent2"/>
+          </a:effectRef>
+          <a:fontRef idx="minor">
+            <a:schemeClr val="dk1"/>
+          </a:fontRef>
+        </p:style>
+      </p:cxnSp>
     </p:spTree>
     <p:extLst>
       <p:ext uri="{BB962C8B-B14F-4D97-AF65-F5344CB8AC3E}">

</xml_diff>

<commit_message>
update pptx for UI
</commit_message>
<xml_diff>
--- a/docs/diagrams/UiComponentClassDiagram.pptx
+++ b/docs/diagrams/UiComponentClassDiagram.pptx
@@ -3545,7 +3545,7 @@
           <a:p>
             <a:pPr algn="ctr"/>
             <a:r>
-              <a:rPr lang="en-US" sz="1050" b="1" dirty="0" err="1">
+              <a:rPr lang="en-US" sz="1050" b="1" dirty="0">
                 <a:solidFill>
                   <a:schemeClr val="accent3">
                     <a:lumMod val="75000"/>
@@ -3605,7 +3605,7 @@
           <a:p>
             <a:pPr algn="ctr"/>
             <a:r>
-              <a:rPr lang="en-US" sz="1050" b="1" dirty="0" err="1">
+              <a:rPr lang="en-US" sz="1050" b="1" dirty="0">
                 <a:solidFill>
                   <a:schemeClr val="accent3">
                     <a:lumMod val="75000"/>
@@ -3668,7 +3668,7 @@
           <a:p>
             <a:pPr algn="ctr"/>
             <a:r>
-              <a:rPr lang="en-US" sz="1050" dirty="0" err="1">
+              <a:rPr lang="en-US" sz="1050" dirty="0">
                 <a:solidFill>
                   <a:schemeClr val="bg1"/>
                 </a:solidFill>
@@ -3918,7 +3918,7 @@
           <a:p>
             <a:pPr algn="ctr"/>
             <a:r>
-              <a:rPr lang="en-US" sz="1050" b="1" dirty="0" err="1">
+              <a:rPr lang="en-US" sz="1050" b="1" dirty="0">
                 <a:solidFill>
                   <a:schemeClr val="accent3">
                     <a:lumMod val="75000"/>
@@ -3978,7 +3978,7 @@
           <a:p>
             <a:pPr algn="ctr"/>
             <a:r>
-              <a:rPr lang="en-US" sz="1050" b="1" dirty="0" err="1">
+              <a:rPr lang="en-US" sz="1050" b="1" dirty="0">
                 <a:solidFill>
                   <a:schemeClr val="accent3">
                     <a:lumMod val="75000"/>
@@ -4098,7 +4098,7 @@
           <a:p>
             <a:pPr algn="ctr"/>
             <a:r>
-              <a:rPr lang="en-US" sz="1050" b="1" dirty="0" err="1" smtClean="0">
+              <a:rPr lang="en-US" sz="1050" b="1" dirty="0" smtClean="0">
                 <a:solidFill>
                   <a:schemeClr val="accent3">
                     <a:lumMod val="75000"/>
@@ -4158,7 +4158,7 @@
           <a:p>
             <a:pPr algn="ctr"/>
             <a:r>
-              <a:rPr lang="en-US" sz="1050" b="1" dirty="0" err="1">
+              <a:rPr lang="en-US" sz="1050" b="1" dirty="0">
                 <a:solidFill>
                   <a:schemeClr val="accent3">
                     <a:lumMod val="75000"/>
@@ -4307,7 +4307,7 @@
           <a:p>
             <a:pPr algn="ctr"/>
             <a:r>
-              <a:rPr lang="en-US" sz="1050" b="1" dirty="0" err="1">
+              <a:rPr lang="en-US" sz="1050" b="1" dirty="0">
                 <a:solidFill>
                   <a:schemeClr val="accent3">
                     <a:lumMod val="75000"/>
@@ -4549,7 +4549,7 @@
               </a:rPr>
             </a:br>
             <a:r>
-              <a:rPr lang="en-US" sz="1050" b="1" dirty="0" err="1">
+              <a:rPr lang="en-US" sz="1050" b="1">
                 <a:solidFill>
                   <a:schemeClr val="accent3">
                     <a:lumMod val="75000"/>
@@ -5597,17 +5597,7 @@
                   </a:schemeClr>
                 </a:solidFill>
               </a:rPr>
-              <a:t>Glossary</a:t>
-            </a:r>
-            <a:r>
-              <a:rPr lang="en-US" sz="1050" b="1" smtClean="0">
-                <a:solidFill>
-                  <a:schemeClr val="accent3">
-                    <a:lumMod val="75000"/>
-                  </a:schemeClr>
-                </a:solidFill>
-              </a:rPr>
-              <a:t>Window</a:t>
+              <a:t>GlossaryWindow</a:t>
             </a:r>
             <a:endParaRPr lang="en-SG" sz="1050" b="1" dirty="0">
               <a:solidFill>

</xml_diff>